<commit_message>
Update changes article and remote workers scenario graphics
</commit_message>
<xml_diff>
--- a/microsoft-365/enterprise/media/empower-people-to-work-remotely/Empower-Remote-Workers-Poster.pptx
+++ b/microsoft-365/enterprise/media/empower-people-to-work-remotely/Empower-Remote-Workers-Poster.pptx
@@ -214,7 +214,7 @@
           <a:p>
             <a:fld id="{F6718B09-A5BF-4500-B7D0-AD2FFA08E103}" type="datetimeFigureOut">
               <a:rPr lang="en-US" smtClean="0"/>
-              <a:t>10/23/2019</a:t>
+              <a:t>10/30/2019</a:t>
             </a:fld>
             <a:endParaRPr lang="en-US" dirty="0"/>
           </a:p>
@@ -610,7 +610,7 @@
           <a:p>
             <a:fld id="{B12B58C5-0F7F-4864-91DB-0DCB63F031BB}" type="datetimeFigureOut">
               <a:rPr lang="en-US" smtClean="0"/>
-              <a:t>10/23/2019</a:t>
+              <a:t>10/30/2019</a:t>
             </a:fld>
             <a:endParaRPr lang="en-US" dirty="0"/>
           </a:p>
@@ -778,7 +778,7 @@
           <a:p>
             <a:fld id="{B12B58C5-0F7F-4864-91DB-0DCB63F031BB}" type="datetimeFigureOut">
               <a:rPr lang="en-US" smtClean="0"/>
-              <a:t>10/23/2019</a:t>
+              <a:t>10/30/2019</a:t>
             </a:fld>
             <a:endParaRPr lang="en-US" dirty="0"/>
           </a:p>
@@ -956,7 +956,7 @@
           <a:p>
             <a:fld id="{B12B58C5-0F7F-4864-91DB-0DCB63F031BB}" type="datetimeFigureOut">
               <a:rPr lang="en-US" smtClean="0"/>
-              <a:t>10/23/2019</a:t>
+              <a:t>10/30/2019</a:t>
             </a:fld>
             <a:endParaRPr lang="en-US" dirty="0"/>
           </a:p>
@@ -1124,7 +1124,7 @@
           <a:p>
             <a:fld id="{B12B58C5-0F7F-4864-91DB-0DCB63F031BB}" type="datetimeFigureOut">
               <a:rPr lang="en-US" smtClean="0"/>
-              <a:t>10/23/2019</a:t>
+              <a:t>10/30/2019</a:t>
             </a:fld>
             <a:endParaRPr lang="en-US" dirty="0"/>
           </a:p>
@@ -1367,7 +1367,7 @@
           <a:p>
             <a:fld id="{B12B58C5-0F7F-4864-91DB-0DCB63F031BB}" type="datetimeFigureOut">
               <a:rPr lang="en-US" smtClean="0"/>
-              <a:t>10/23/2019</a:t>
+              <a:t>10/30/2019</a:t>
             </a:fld>
             <a:endParaRPr lang="en-US" dirty="0"/>
           </a:p>
@@ -1596,7 +1596,7 @@
           <a:p>
             <a:fld id="{B12B58C5-0F7F-4864-91DB-0DCB63F031BB}" type="datetimeFigureOut">
               <a:rPr lang="en-US" smtClean="0"/>
-              <a:t>10/23/2019</a:t>
+              <a:t>10/30/2019</a:t>
             </a:fld>
             <a:endParaRPr lang="en-US" dirty="0"/>
           </a:p>
@@ -1960,7 +1960,7 @@
           <a:p>
             <a:fld id="{B12B58C5-0F7F-4864-91DB-0DCB63F031BB}" type="datetimeFigureOut">
               <a:rPr lang="en-US" smtClean="0"/>
-              <a:t>10/23/2019</a:t>
+              <a:t>10/30/2019</a:t>
             </a:fld>
             <a:endParaRPr lang="en-US" dirty="0"/>
           </a:p>
@@ -2077,7 +2077,7 @@
           <a:p>
             <a:fld id="{B12B58C5-0F7F-4864-91DB-0DCB63F031BB}" type="datetimeFigureOut">
               <a:rPr lang="en-US" smtClean="0"/>
-              <a:t>10/23/2019</a:t>
+              <a:t>10/30/2019</a:t>
             </a:fld>
             <a:endParaRPr lang="en-US" dirty="0"/>
           </a:p>
@@ -2172,7 +2172,7 @@
           <a:p>
             <a:fld id="{B12B58C5-0F7F-4864-91DB-0DCB63F031BB}" type="datetimeFigureOut">
               <a:rPr lang="en-US" smtClean="0"/>
-              <a:t>10/23/2019</a:t>
+              <a:t>10/30/2019</a:t>
             </a:fld>
             <a:endParaRPr lang="en-US" dirty="0"/>
           </a:p>
@@ -2447,7 +2447,7 @@
           <a:p>
             <a:fld id="{B12B58C5-0F7F-4864-91DB-0DCB63F031BB}" type="datetimeFigureOut">
               <a:rPr lang="en-US" smtClean="0"/>
-              <a:t>10/23/2019</a:t>
+              <a:t>10/30/2019</a:t>
             </a:fld>
             <a:endParaRPr lang="en-US" dirty="0"/>
           </a:p>
@@ -2702,7 +2702,7 @@
           <a:p>
             <a:fld id="{B12B58C5-0F7F-4864-91DB-0DCB63F031BB}" type="datetimeFigureOut">
               <a:rPr lang="en-US" smtClean="0"/>
-              <a:t>10/23/2019</a:t>
+              <a:t>10/30/2019</a:t>
             </a:fld>
             <a:endParaRPr lang="en-US" dirty="0"/>
           </a:p>
@@ -2913,7 +2913,7 @@
           <a:p>
             <a:fld id="{B12B58C5-0F7F-4864-91DB-0DCB63F031BB}" type="datetimeFigureOut">
               <a:rPr lang="en-US" smtClean="0"/>
-              <a:t>10/23/2019</a:t>
+              <a:t>10/30/2019</a:t>
             </a:fld>
             <a:endParaRPr lang="en-US" dirty="0"/>
           </a:p>
@@ -18026,7 +18026,7 @@
               <a:rPr lang="en-US">
                 <a:latin typeface="Segoe UI Light" pitchFamily="34" charset="0"/>
               </a:rPr>
-              <a:t>Azure  AD</a:t>
+              <a:t>Azure AD</a:t>
             </a:r>
             <a:endParaRPr lang="en-US" dirty="0">
               <a:latin typeface="Segoe UI Light" pitchFamily="34" charset="0"/>

</xml_diff>